<commit_message>
angular-cli upgrade to 1.7.1
</commit_message>
<xml_diff>
--- a/misc/creator.pptx
+++ b/misc/creator.pptx
@@ -105,7 +105,16 @@
       </a:defRPr>
     </a:lvl9pPr>
   </p:defaultTextStyle>
+  <p:extLst>
+    <p:ext uri="{EFAFB233-063F-42B5-8137-9DF3F51BA10A}">
+      <p15:sldGuideLst xmlns:p15="http://schemas.microsoft.com/office/powerpoint/2012/main"/>
+    </p:ext>
+  </p:extLst>
 </p:presentation>
+</file>
+
+<file path=ppt/revisionInfo.xml><?xml version="1.0" encoding="utf-8"?>
+<p1510:revInfo xmlns:a="http://schemas.openxmlformats.org/drawingml/2006/main" xmlns:r="http://schemas.openxmlformats.org/officeDocument/2006/relationships" xmlns:p1510="http://schemas.microsoft.com/office/powerpoint/2015/10/main"/>
 </file>
 
 <file path=ppt/slideLayouts/slideLayout1.xml><?xml version="1.0" encoding="utf-8"?>
@@ -150,7 +159,7 @@
           </a:lstStyle>
           <a:p>
             <a:r>
-              <a:rPr lang="ru-RU" smtClean="0"/>
+              <a:rPr lang="ru-RU"/>
               <a:t>Образец заголовка</a:t>
             </a:r>
             <a:endParaRPr lang="en-US" dirty="0"/>
@@ -215,7 +224,7 @@
           </a:lstStyle>
           <a:p>
             <a:r>
-              <a:rPr lang="ru-RU" smtClean="0"/>
+              <a:rPr lang="ru-RU"/>
               <a:t>Образец подзаголовка</a:t>
             </a:r>
             <a:endParaRPr lang="en-US" dirty="0"/>
@@ -239,7 +248,7 @@
           <a:p>
             <a:fld id="{2F39FD68-B84F-4ABF-AB1F-052F91699C1D}" type="datetimeFigureOut">
               <a:rPr lang="en-US" smtClean="0"/>
-              <a:t>11/9/2017</a:t>
+              <a:t>2/27/2018</a:t>
             </a:fld>
             <a:endParaRPr lang="en-US"/>
           </a:p>
@@ -333,7 +342,7 @@
           <a:lstStyle/>
           <a:p>
             <a:r>
-              <a:rPr lang="ru-RU" smtClean="0"/>
+              <a:rPr lang="ru-RU"/>
               <a:t>Образец заголовка</a:t>
             </a:r>
             <a:endParaRPr lang="en-US" dirty="0"/>
@@ -357,35 +366,35 @@
           <a:p>
             <a:pPr lvl="0"/>
             <a:r>
-              <a:rPr lang="ru-RU" smtClean="0"/>
+              <a:rPr lang="ru-RU"/>
               <a:t>Образец текста</a:t>
             </a:r>
           </a:p>
           <a:p>
             <a:pPr lvl="1"/>
             <a:r>
-              <a:rPr lang="ru-RU" smtClean="0"/>
+              <a:rPr lang="ru-RU"/>
               <a:t>Второй уровень</a:t>
             </a:r>
           </a:p>
           <a:p>
             <a:pPr lvl="2"/>
             <a:r>
-              <a:rPr lang="ru-RU" smtClean="0"/>
+              <a:rPr lang="ru-RU"/>
               <a:t>Третий уровень</a:t>
             </a:r>
           </a:p>
           <a:p>
             <a:pPr lvl="3"/>
             <a:r>
-              <a:rPr lang="ru-RU" smtClean="0"/>
+              <a:rPr lang="ru-RU"/>
               <a:t>Четвертый уровень</a:t>
             </a:r>
           </a:p>
           <a:p>
             <a:pPr lvl="4"/>
             <a:r>
-              <a:rPr lang="ru-RU" smtClean="0"/>
+              <a:rPr lang="ru-RU"/>
               <a:t>Пятый уровень</a:t>
             </a:r>
             <a:endParaRPr lang="en-US" dirty="0"/>
@@ -409,7 +418,7 @@
           <a:p>
             <a:fld id="{2F39FD68-B84F-4ABF-AB1F-052F91699C1D}" type="datetimeFigureOut">
               <a:rPr lang="en-US" smtClean="0"/>
-              <a:t>11/9/2017</a:t>
+              <a:t>2/27/2018</a:t>
             </a:fld>
             <a:endParaRPr lang="en-US"/>
           </a:p>
@@ -508,7 +517,7 @@
           <a:lstStyle/>
           <a:p>
             <a:r>
-              <a:rPr lang="ru-RU" smtClean="0"/>
+              <a:rPr lang="ru-RU"/>
               <a:t>Образец заголовка</a:t>
             </a:r>
             <a:endParaRPr lang="en-US" dirty="0"/>
@@ -537,35 +546,35 @@
           <a:p>
             <a:pPr lvl="0"/>
             <a:r>
-              <a:rPr lang="ru-RU" smtClean="0"/>
+              <a:rPr lang="ru-RU"/>
               <a:t>Образец текста</a:t>
             </a:r>
           </a:p>
           <a:p>
             <a:pPr lvl="1"/>
             <a:r>
-              <a:rPr lang="ru-RU" smtClean="0"/>
+              <a:rPr lang="ru-RU"/>
               <a:t>Второй уровень</a:t>
             </a:r>
           </a:p>
           <a:p>
             <a:pPr lvl="2"/>
             <a:r>
-              <a:rPr lang="ru-RU" smtClean="0"/>
+              <a:rPr lang="ru-RU"/>
               <a:t>Третий уровень</a:t>
             </a:r>
           </a:p>
           <a:p>
             <a:pPr lvl="3"/>
             <a:r>
-              <a:rPr lang="ru-RU" smtClean="0"/>
+              <a:rPr lang="ru-RU"/>
               <a:t>Четвертый уровень</a:t>
             </a:r>
           </a:p>
           <a:p>
             <a:pPr lvl="4"/>
             <a:r>
-              <a:rPr lang="ru-RU" smtClean="0"/>
+              <a:rPr lang="ru-RU"/>
               <a:t>Пятый уровень</a:t>
             </a:r>
             <a:endParaRPr lang="en-US" dirty="0"/>
@@ -589,7 +598,7 @@
           <a:p>
             <a:fld id="{2F39FD68-B84F-4ABF-AB1F-052F91699C1D}" type="datetimeFigureOut">
               <a:rPr lang="en-US" smtClean="0"/>
-              <a:t>11/9/2017</a:t>
+              <a:t>2/27/2018</a:t>
             </a:fld>
             <a:endParaRPr lang="en-US"/>
           </a:p>
@@ -683,7 +692,7 @@
           <a:lstStyle/>
           <a:p>
             <a:r>
-              <a:rPr lang="ru-RU" smtClean="0"/>
+              <a:rPr lang="ru-RU"/>
               <a:t>Образец заголовка</a:t>
             </a:r>
             <a:endParaRPr lang="en-US" dirty="0"/>
@@ -707,35 +716,35 @@
           <a:p>
             <a:pPr lvl="0"/>
             <a:r>
-              <a:rPr lang="ru-RU" smtClean="0"/>
+              <a:rPr lang="ru-RU"/>
               <a:t>Образец текста</a:t>
             </a:r>
           </a:p>
           <a:p>
             <a:pPr lvl="1"/>
             <a:r>
-              <a:rPr lang="ru-RU" smtClean="0"/>
+              <a:rPr lang="ru-RU"/>
               <a:t>Второй уровень</a:t>
             </a:r>
           </a:p>
           <a:p>
             <a:pPr lvl="2"/>
             <a:r>
-              <a:rPr lang="ru-RU" smtClean="0"/>
+              <a:rPr lang="ru-RU"/>
               <a:t>Третий уровень</a:t>
             </a:r>
           </a:p>
           <a:p>
             <a:pPr lvl="3"/>
             <a:r>
-              <a:rPr lang="ru-RU" smtClean="0"/>
+              <a:rPr lang="ru-RU"/>
               <a:t>Четвертый уровень</a:t>
             </a:r>
           </a:p>
           <a:p>
             <a:pPr lvl="4"/>
             <a:r>
-              <a:rPr lang="ru-RU" smtClean="0"/>
+              <a:rPr lang="ru-RU"/>
               <a:t>Пятый уровень</a:t>
             </a:r>
             <a:endParaRPr lang="en-US" dirty="0"/>
@@ -759,7 +768,7 @@
           <a:p>
             <a:fld id="{2F39FD68-B84F-4ABF-AB1F-052F91699C1D}" type="datetimeFigureOut">
               <a:rPr lang="en-US" smtClean="0"/>
-              <a:t>11/9/2017</a:t>
+              <a:t>2/27/2018</a:t>
             </a:fld>
             <a:endParaRPr lang="en-US"/>
           </a:p>
@@ -862,7 +871,7 @@
           </a:lstStyle>
           <a:p>
             <a:r>
-              <a:rPr lang="ru-RU" smtClean="0"/>
+              <a:rPr lang="ru-RU"/>
               <a:t>Образец заголовка</a:t>
             </a:r>
             <a:endParaRPr lang="en-US" dirty="0"/>
@@ -980,7 +989,7 @@
           <a:p>
             <a:pPr lvl="0"/>
             <a:r>
-              <a:rPr lang="ru-RU" smtClean="0"/>
+              <a:rPr lang="ru-RU"/>
               <a:t>Образец текста</a:t>
             </a:r>
           </a:p>
@@ -1003,7 +1012,7 @@
           <a:p>
             <a:fld id="{2F39FD68-B84F-4ABF-AB1F-052F91699C1D}" type="datetimeFigureOut">
               <a:rPr lang="en-US" smtClean="0"/>
-              <a:t>11/9/2017</a:t>
+              <a:t>2/27/2018</a:t>
             </a:fld>
             <a:endParaRPr lang="en-US"/>
           </a:p>
@@ -1097,7 +1106,7 @@
           <a:lstStyle/>
           <a:p>
             <a:r>
-              <a:rPr lang="ru-RU" smtClean="0"/>
+              <a:rPr lang="ru-RU"/>
               <a:t>Образец заголовка</a:t>
             </a:r>
             <a:endParaRPr lang="en-US" dirty="0"/>
@@ -1126,35 +1135,35 @@
           <a:p>
             <a:pPr lvl="0"/>
             <a:r>
-              <a:rPr lang="ru-RU" smtClean="0"/>
+              <a:rPr lang="ru-RU"/>
               <a:t>Образец текста</a:t>
             </a:r>
           </a:p>
           <a:p>
             <a:pPr lvl="1"/>
             <a:r>
-              <a:rPr lang="ru-RU" smtClean="0"/>
+              <a:rPr lang="ru-RU"/>
               <a:t>Второй уровень</a:t>
             </a:r>
           </a:p>
           <a:p>
             <a:pPr lvl="2"/>
             <a:r>
-              <a:rPr lang="ru-RU" smtClean="0"/>
+              <a:rPr lang="ru-RU"/>
               <a:t>Третий уровень</a:t>
             </a:r>
           </a:p>
           <a:p>
             <a:pPr lvl="3"/>
             <a:r>
-              <a:rPr lang="ru-RU" smtClean="0"/>
+              <a:rPr lang="ru-RU"/>
               <a:t>Четвертый уровень</a:t>
             </a:r>
           </a:p>
           <a:p>
             <a:pPr lvl="4"/>
             <a:r>
-              <a:rPr lang="ru-RU" smtClean="0"/>
+              <a:rPr lang="ru-RU"/>
               <a:t>Пятый уровень</a:t>
             </a:r>
             <a:endParaRPr lang="en-US" dirty="0"/>
@@ -1183,35 +1192,35 @@
           <a:p>
             <a:pPr lvl="0"/>
             <a:r>
-              <a:rPr lang="ru-RU" smtClean="0"/>
+              <a:rPr lang="ru-RU"/>
               <a:t>Образец текста</a:t>
             </a:r>
           </a:p>
           <a:p>
             <a:pPr lvl="1"/>
             <a:r>
-              <a:rPr lang="ru-RU" smtClean="0"/>
+              <a:rPr lang="ru-RU"/>
               <a:t>Второй уровень</a:t>
             </a:r>
           </a:p>
           <a:p>
             <a:pPr lvl="2"/>
             <a:r>
-              <a:rPr lang="ru-RU" smtClean="0"/>
+              <a:rPr lang="ru-RU"/>
               <a:t>Третий уровень</a:t>
             </a:r>
           </a:p>
           <a:p>
             <a:pPr lvl="3"/>
             <a:r>
-              <a:rPr lang="ru-RU" smtClean="0"/>
+              <a:rPr lang="ru-RU"/>
               <a:t>Четвертый уровень</a:t>
             </a:r>
           </a:p>
           <a:p>
             <a:pPr lvl="4"/>
             <a:r>
-              <a:rPr lang="ru-RU" smtClean="0"/>
+              <a:rPr lang="ru-RU"/>
               <a:t>Пятый уровень</a:t>
             </a:r>
             <a:endParaRPr lang="en-US" dirty="0"/>
@@ -1235,7 +1244,7 @@
           <a:p>
             <a:fld id="{2F39FD68-B84F-4ABF-AB1F-052F91699C1D}" type="datetimeFigureOut">
               <a:rPr lang="en-US" smtClean="0"/>
-              <a:t>11/9/2017</a:t>
+              <a:t>2/27/2018</a:t>
             </a:fld>
             <a:endParaRPr lang="en-US"/>
           </a:p>
@@ -1334,7 +1343,7 @@
           <a:lstStyle/>
           <a:p>
             <a:r>
-              <a:rPr lang="ru-RU" smtClean="0"/>
+              <a:rPr lang="ru-RU"/>
               <a:t>Образец заголовка</a:t>
             </a:r>
             <a:endParaRPr lang="en-US" dirty="0"/>
@@ -1400,7 +1409,7 @@
           <a:p>
             <a:pPr lvl="0"/>
             <a:r>
-              <a:rPr lang="ru-RU" smtClean="0"/>
+              <a:rPr lang="ru-RU"/>
               <a:t>Образец текста</a:t>
             </a:r>
           </a:p>
@@ -1428,35 +1437,35 @@
           <a:p>
             <a:pPr lvl="0"/>
             <a:r>
-              <a:rPr lang="ru-RU" smtClean="0"/>
+              <a:rPr lang="ru-RU"/>
               <a:t>Образец текста</a:t>
             </a:r>
           </a:p>
           <a:p>
             <a:pPr lvl="1"/>
             <a:r>
-              <a:rPr lang="ru-RU" smtClean="0"/>
+              <a:rPr lang="ru-RU"/>
               <a:t>Второй уровень</a:t>
             </a:r>
           </a:p>
           <a:p>
             <a:pPr lvl="2"/>
             <a:r>
-              <a:rPr lang="ru-RU" smtClean="0"/>
+              <a:rPr lang="ru-RU"/>
               <a:t>Третий уровень</a:t>
             </a:r>
           </a:p>
           <a:p>
             <a:pPr lvl="3"/>
             <a:r>
-              <a:rPr lang="ru-RU" smtClean="0"/>
+              <a:rPr lang="ru-RU"/>
               <a:t>Четвертый уровень</a:t>
             </a:r>
           </a:p>
           <a:p>
             <a:pPr lvl="4"/>
             <a:r>
-              <a:rPr lang="ru-RU" smtClean="0"/>
+              <a:rPr lang="ru-RU"/>
               <a:t>Пятый уровень</a:t>
             </a:r>
             <a:endParaRPr lang="en-US" dirty="0"/>
@@ -1522,7 +1531,7 @@
           <a:p>
             <a:pPr lvl="0"/>
             <a:r>
-              <a:rPr lang="ru-RU" smtClean="0"/>
+              <a:rPr lang="ru-RU"/>
               <a:t>Образец текста</a:t>
             </a:r>
           </a:p>
@@ -1550,35 +1559,35 @@
           <a:p>
             <a:pPr lvl="0"/>
             <a:r>
-              <a:rPr lang="ru-RU" smtClean="0"/>
+              <a:rPr lang="ru-RU"/>
               <a:t>Образец текста</a:t>
             </a:r>
           </a:p>
           <a:p>
             <a:pPr lvl="1"/>
             <a:r>
-              <a:rPr lang="ru-RU" smtClean="0"/>
+              <a:rPr lang="ru-RU"/>
               <a:t>Второй уровень</a:t>
             </a:r>
           </a:p>
           <a:p>
             <a:pPr lvl="2"/>
             <a:r>
-              <a:rPr lang="ru-RU" smtClean="0"/>
+              <a:rPr lang="ru-RU"/>
               <a:t>Третий уровень</a:t>
             </a:r>
           </a:p>
           <a:p>
             <a:pPr lvl="3"/>
             <a:r>
-              <a:rPr lang="ru-RU" smtClean="0"/>
+              <a:rPr lang="ru-RU"/>
               <a:t>Четвертый уровень</a:t>
             </a:r>
           </a:p>
           <a:p>
             <a:pPr lvl="4"/>
             <a:r>
-              <a:rPr lang="ru-RU" smtClean="0"/>
+              <a:rPr lang="ru-RU"/>
               <a:t>Пятый уровень</a:t>
             </a:r>
             <a:endParaRPr lang="en-US" dirty="0"/>
@@ -1602,7 +1611,7 @@
           <a:p>
             <a:fld id="{2F39FD68-B84F-4ABF-AB1F-052F91699C1D}" type="datetimeFigureOut">
               <a:rPr lang="en-US" smtClean="0"/>
-              <a:t>11/9/2017</a:t>
+              <a:t>2/27/2018</a:t>
             </a:fld>
             <a:endParaRPr lang="en-US"/>
           </a:p>
@@ -1696,7 +1705,7 @@
           <a:lstStyle/>
           <a:p>
             <a:r>
-              <a:rPr lang="ru-RU" smtClean="0"/>
+              <a:rPr lang="ru-RU"/>
               <a:t>Образец заголовка</a:t>
             </a:r>
             <a:endParaRPr lang="en-US" dirty="0"/>
@@ -1720,7 +1729,7 @@
           <a:p>
             <a:fld id="{2F39FD68-B84F-4ABF-AB1F-052F91699C1D}" type="datetimeFigureOut">
               <a:rPr lang="en-US" smtClean="0"/>
-              <a:t>11/9/2017</a:t>
+              <a:t>2/27/2018</a:t>
             </a:fld>
             <a:endParaRPr lang="en-US"/>
           </a:p>
@@ -1815,7 +1824,7 @@
           <a:p>
             <a:fld id="{2F39FD68-B84F-4ABF-AB1F-052F91699C1D}" type="datetimeFigureOut">
               <a:rPr lang="en-US" smtClean="0"/>
-              <a:t>11/9/2017</a:t>
+              <a:t>2/27/2018</a:t>
             </a:fld>
             <a:endParaRPr lang="en-US"/>
           </a:p>
@@ -1918,7 +1927,7 @@
           </a:lstStyle>
           <a:p>
             <a:r>
-              <a:rPr lang="ru-RU" smtClean="0"/>
+              <a:rPr lang="ru-RU"/>
               <a:t>Образец заголовка</a:t>
             </a:r>
             <a:endParaRPr lang="en-US" dirty="0"/>
@@ -1975,35 +1984,35 @@
           <a:p>
             <a:pPr lvl="0"/>
             <a:r>
-              <a:rPr lang="ru-RU" smtClean="0"/>
+              <a:rPr lang="ru-RU"/>
               <a:t>Образец текста</a:t>
             </a:r>
           </a:p>
           <a:p>
             <a:pPr lvl="1"/>
             <a:r>
-              <a:rPr lang="ru-RU" smtClean="0"/>
+              <a:rPr lang="ru-RU"/>
               <a:t>Второй уровень</a:t>
             </a:r>
           </a:p>
           <a:p>
             <a:pPr lvl="2"/>
             <a:r>
-              <a:rPr lang="ru-RU" smtClean="0"/>
+              <a:rPr lang="ru-RU"/>
               <a:t>Третий уровень</a:t>
             </a:r>
           </a:p>
           <a:p>
             <a:pPr lvl="3"/>
             <a:r>
-              <a:rPr lang="ru-RU" smtClean="0"/>
+              <a:rPr lang="ru-RU"/>
               <a:t>Четвертый уровень</a:t>
             </a:r>
           </a:p>
           <a:p>
             <a:pPr lvl="4"/>
             <a:r>
-              <a:rPr lang="ru-RU" smtClean="0"/>
+              <a:rPr lang="ru-RU"/>
               <a:t>Пятый уровень</a:t>
             </a:r>
             <a:endParaRPr lang="en-US" dirty="0"/>
@@ -2069,7 +2078,7 @@
           <a:p>
             <a:pPr lvl="0"/>
             <a:r>
-              <a:rPr lang="ru-RU" smtClean="0"/>
+              <a:rPr lang="ru-RU"/>
               <a:t>Образец текста</a:t>
             </a:r>
           </a:p>
@@ -2092,7 +2101,7 @@
           <a:p>
             <a:fld id="{2F39FD68-B84F-4ABF-AB1F-052F91699C1D}" type="datetimeFigureOut">
               <a:rPr lang="en-US" smtClean="0"/>
-              <a:t>11/9/2017</a:t>
+              <a:t>2/27/2018</a:t>
             </a:fld>
             <a:endParaRPr lang="en-US"/>
           </a:p>
@@ -2195,7 +2204,7 @@
           </a:lstStyle>
           <a:p>
             <a:r>
-              <a:rPr lang="ru-RU" smtClean="0"/>
+              <a:rPr lang="ru-RU"/>
               <a:t>Образец заголовка</a:t>
             </a:r>
             <a:endParaRPr lang="en-US" dirty="0"/>
@@ -2260,7 +2269,7 @@
           </a:lstStyle>
           <a:p>
             <a:r>
-              <a:rPr lang="ru-RU" smtClean="0"/>
+              <a:rPr lang="ru-RU"/>
               <a:t>Вставка рисунка</a:t>
             </a:r>
             <a:endParaRPr lang="en-US" dirty="0"/>
@@ -2326,7 +2335,7 @@
           <a:p>
             <a:pPr lvl="0"/>
             <a:r>
-              <a:rPr lang="ru-RU" smtClean="0"/>
+              <a:rPr lang="ru-RU"/>
               <a:t>Образец текста</a:t>
             </a:r>
           </a:p>
@@ -2349,7 +2358,7 @@
           <a:p>
             <a:fld id="{2F39FD68-B84F-4ABF-AB1F-052F91699C1D}" type="datetimeFigureOut">
               <a:rPr lang="en-US" smtClean="0"/>
-              <a:t>11/9/2017</a:t>
+              <a:t>2/27/2018</a:t>
             </a:fld>
             <a:endParaRPr lang="en-US"/>
           </a:p>
@@ -2458,7 +2467,7 @@
           <a:lstStyle/>
           <a:p>
             <a:r>
-              <a:rPr lang="ru-RU" smtClean="0"/>
+              <a:rPr lang="ru-RU"/>
               <a:t>Образец заголовка</a:t>
             </a:r>
             <a:endParaRPr lang="en-US" dirty="0"/>
@@ -2492,35 +2501,35 @@
           <a:p>
             <a:pPr lvl="0"/>
             <a:r>
-              <a:rPr lang="ru-RU" smtClean="0"/>
+              <a:rPr lang="ru-RU"/>
               <a:t>Образец текста</a:t>
             </a:r>
           </a:p>
           <a:p>
             <a:pPr lvl="1"/>
             <a:r>
-              <a:rPr lang="ru-RU" smtClean="0"/>
+              <a:rPr lang="ru-RU"/>
               <a:t>Второй уровень</a:t>
             </a:r>
           </a:p>
           <a:p>
             <a:pPr lvl="2"/>
             <a:r>
-              <a:rPr lang="ru-RU" smtClean="0"/>
+              <a:rPr lang="ru-RU"/>
               <a:t>Третий уровень</a:t>
             </a:r>
           </a:p>
           <a:p>
             <a:pPr lvl="3"/>
             <a:r>
-              <a:rPr lang="ru-RU" smtClean="0"/>
+              <a:rPr lang="ru-RU"/>
               <a:t>Четвертый уровень</a:t>
             </a:r>
           </a:p>
           <a:p>
             <a:pPr lvl="4"/>
             <a:r>
-              <a:rPr lang="ru-RU" smtClean="0"/>
+              <a:rPr lang="ru-RU"/>
               <a:t>Пятый уровень</a:t>
             </a:r>
             <a:endParaRPr lang="en-US" dirty="0"/>
@@ -2562,7 +2571,7 @@
           <a:p>
             <a:fld id="{2F39FD68-B84F-4ABF-AB1F-052F91699C1D}" type="datetimeFigureOut">
               <a:rPr lang="en-US" smtClean="0"/>
-              <a:t>11/9/2017</a:t>
+              <a:t>2/27/2018</a:t>
             </a:fld>
             <a:endParaRPr lang="en-US"/>
           </a:p>
@@ -3062,10 +3071,13 @@
           <a:lstStyle/>
           <a:p>
             <a:r>
-              <a:rPr lang="en-US" dirty="0" smtClean="0"/>
+              <a:rPr lang="en-US" dirty="0">
+                <a:solidFill>
+                  <a:srgbClr val="0070C0"/>
+                </a:solidFill>
+              </a:rPr>
               <a:t>Favicon</a:t>
             </a:r>
-            <a:endParaRPr lang="en-US" dirty="0"/>
           </a:p>
         </p:txBody>
       </p:sp>

</xml_diff>